<commit_message>
Eliminar archivos y código innecesarios
</commit_message>
<xml_diff>
--- a/Documentación/Pantalla/Panrtallas.pptx
+++ b/Documentación/Pantalla/Panrtallas.pptx
@@ -179,7 +179,82 @@
 <file path=ppt/authors.xml><?xml version="1.0" encoding="utf-8"?>
 <p188:authorLst xmlns:a="http://schemas.openxmlformats.org/drawingml/2006/main" xmlns:r="http://schemas.openxmlformats.org/officeDocument/2006/relationships" xmlns:p188="http://schemas.microsoft.com/office/powerpoint/2018/8/main">
   <p188:author id="{55A5F416-BCD5-192D-D59C-DC68CAB0C94C}" name="Andres Felipe  Martinez Henao" initials="AM" userId="S::f.martinez5@utp.edu.co::cf30ace8-34a1-4671-af82-85446a58319f" providerId="AD"/>
+  <p188:author id="{D025BA68-3F76-601D-C171-8E160B9D175B}" name="andres felipe martinez henao" initials="am" userId="0fdce9a793085e1e" providerId="Windows Live"/>
 </p188:authorLst>
+</file>
+
+<file path=ppt/changesInfos/changesInfo1.xml><?xml version="1.0" encoding="utf-8"?>
+<pc:chgInfo xmlns:a="http://schemas.openxmlformats.org/drawingml/2006/main" xmlns:r="http://schemas.openxmlformats.org/officeDocument/2006/relationships" xmlns:ac="http://schemas.microsoft.com/office/drawing/2013/main/command" xmlns:pc="http://schemas.microsoft.com/office/powerpoint/2013/main/command">
+  <pc:docChgLst>
+    <pc:chgData name="andres felipe martinez henao" userId="0fdce9a793085e1e" providerId="LiveId" clId="{9716454F-F13D-4ED7-9F25-607F2B49C811}"/>
+    <pc:docChg chg="modSld">
+      <pc:chgData name="andres felipe martinez henao" userId="0fdce9a793085e1e" providerId="LiveId" clId="{9716454F-F13D-4ED7-9F25-607F2B49C811}" dt="2024-10-17T04:41:00.242" v="3" actId="207"/>
+      <pc:docMkLst>
+        <pc:docMk/>
+      </pc:docMkLst>
+      <pc:sldChg chg="modSp mod">
+        <pc:chgData name="andres felipe martinez henao" userId="0fdce9a793085e1e" providerId="LiveId" clId="{9716454F-F13D-4ED7-9F25-607F2B49C811}" dt="2024-10-17T04:41:00.242" v="3" actId="207"/>
+        <pc:sldMkLst>
+          <pc:docMk/>
+          <pc:sldMk cId="592554847" sldId="258"/>
+        </pc:sldMkLst>
+        <pc:spChg chg="mod">
+          <ac:chgData name="andres felipe martinez henao" userId="0fdce9a793085e1e" providerId="LiveId" clId="{9716454F-F13D-4ED7-9F25-607F2B49C811}" dt="2024-10-17T04:41:00.242" v="3" actId="207"/>
+          <ac:spMkLst>
+            <pc:docMk/>
+            <pc:sldMk cId="592554847" sldId="258"/>
+            <ac:spMk id="7" creationId="{273018A8-E9F7-2689-81FC-A6B1CB507458}"/>
+          </ac:spMkLst>
+        </pc:spChg>
+      </pc:sldChg>
+      <pc:sldChg chg="modSp mod">
+        <pc:chgData name="andres felipe martinez henao" userId="0fdce9a793085e1e" providerId="LiveId" clId="{9716454F-F13D-4ED7-9F25-607F2B49C811}" dt="2024-10-17T04:39:10.328" v="0" actId="207"/>
+        <pc:sldMkLst>
+          <pc:docMk/>
+          <pc:sldMk cId="522194473" sldId="262"/>
+        </pc:sldMkLst>
+        <pc:spChg chg="mod">
+          <ac:chgData name="andres felipe martinez henao" userId="0fdce9a793085e1e" providerId="LiveId" clId="{9716454F-F13D-4ED7-9F25-607F2B49C811}" dt="2024-10-17T04:39:10.328" v="0" actId="207"/>
+          <ac:spMkLst>
+            <pc:docMk/>
+            <pc:sldMk cId="522194473" sldId="262"/>
+            <ac:spMk id="6" creationId="{12125515-7664-0FB3-23BE-D7F73C29F863}"/>
+          </ac:spMkLst>
+        </pc:spChg>
+      </pc:sldChg>
+      <pc:sldChg chg="modSp mod">
+        <pc:chgData name="andres felipe martinez henao" userId="0fdce9a793085e1e" providerId="LiveId" clId="{9716454F-F13D-4ED7-9F25-607F2B49C811}" dt="2024-10-17T04:39:20.922" v="1" actId="207"/>
+        <pc:sldMkLst>
+          <pc:docMk/>
+          <pc:sldMk cId="3598763038" sldId="264"/>
+        </pc:sldMkLst>
+        <pc:spChg chg="mod">
+          <ac:chgData name="andres felipe martinez henao" userId="0fdce9a793085e1e" providerId="LiveId" clId="{9716454F-F13D-4ED7-9F25-607F2B49C811}" dt="2024-10-17T04:39:20.922" v="1" actId="207"/>
+          <ac:spMkLst>
+            <pc:docMk/>
+            <pc:sldMk cId="3598763038" sldId="264"/>
+            <ac:spMk id="6" creationId="{8D7F302C-76A3-1569-045C-633FE730FA2F}"/>
+          </ac:spMkLst>
+        </pc:spChg>
+      </pc:sldChg>
+      <pc:sldChg chg="modSp mod">
+        <pc:chgData name="andres felipe martinez henao" userId="0fdce9a793085e1e" providerId="LiveId" clId="{9716454F-F13D-4ED7-9F25-607F2B49C811}" dt="2024-10-17T04:39:40.365" v="2" actId="207"/>
+        <pc:sldMkLst>
+          <pc:docMk/>
+          <pc:sldMk cId="4095271877" sldId="265"/>
+        </pc:sldMkLst>
+        <pc:spChg chg="mod">
+          <ac:chgData name="andres felipe martinez henao" userId="0fdce9a793085e1e" providerId="LiveId" clId="{9716454F-F13D-4ED7-9F25-607F2B49C811}" dt="2024-10-17T04:39:40.365" v="2" actId="207"/>
+          <ac:spMkLst>
+            <pc:docMk/>
+            <pc:sldMk cId="4095271877" sldId="265"/>
+            <ac:spMk id="7" creationId="{29B1CD8F-8A58-B976-B095-F149E389B831}"/>
+          </ac:spMkLst>
+        </pc:spChg>
+      </pc:sldChg>
+    </pc:docChg>
+  </pc:docChgLst>
+</pc:chgInfo>
 </file>
 
 <file path=ppt/comments/modernComment_104_777F6535.xml><?xml version="1.0" encoding="utf-8"?>
@@ -296,7 +371,7 @@
           <a:p>
             <a:fld id="{082EC90D-3FAF-437A-A775-97B2260FD027}" type="datetimeFigureOut">
               <a:rPr lang="es-419" smtClean="0"/>
-              <a:t>24/9/2024</a:t>
+              <a:t>16/10/2024</a:t>
             </a:fld>
             <a:endParaRPr lang="es-419"/>
           </a:p>
@@ -1703,7 +1778,7 @@
           <a:p>
             <a:fld id="{221FC538-35DC-4230-8357-1F07396E8063}" type="datetimeFigureOut">
               <a:rPr lang="es-419" smtClean="0"/>
-              <a:t>24/9/2024</a:t>
+              <a:t>16/10/2024</a:t>
             </a:fld>
             <a:endParaRPr lang="es-419"/>
           </a:p>
@@ -1903,7 +1978,7 @@
           <a:p>
             <a:fld id="{221FC538-35DC-4230-8357-1F07396E8063}" type="datetimeFigureOut">
               <a:rPr lang="es-419" smtClean="0"/>
-              <a:t>24/9/2024</a:t>
+              <a:t>16/10/2024</a:t>
             </a:fld>
             <a:endParaRPr lang="es-419"/>
           </a:p>
@@ -2113,7 +2188,7 @@
           <a:p>
             <a:fld id="{221FC538-35DC-4230-8357-1F07396E8063}" type="datetimeFigureOut">
               <a:rPr lang="es-419" smtClean="0"/>
-              <a:t>24/9/2024</a:t>
+              <a:t>16/10/2024</a:t>
             </a:fld>
             <a:endParaRPr lang="es-419"/>
           </a:p>
@@ -2313,7 +2388,7 @@
           <a:p>
             <a:fld id="{221FC538-35DC-4230-8357-1F07396E8063}" type="datetimeFigureOut">
               <a:rPr lang="es-419" smtClean="0"/>
-              <a:t>24/9/2024</a:t>
+              <a:t>16/10/2024</a:t>
             </a:fld>
             <a:endParaRPr lang="es-419"/>
           </a:p>
@@ -2589,7 +2664,7 @@
           <a:p>
             <a:fld id="{221FC538-35DC-4230-8357-1F07396E8063}" type="datetimeFigureOut">
               <a:rPr lang="es-419" smtClean="0"/>
-              <a:t>24/9/2024</a:t>
+              <a:t>16/10/2024</a:t>
             </a:fld>
             <a:endParaRPr lang="es-419"/>
           </a:p>
@@ -2857,7 +2932,7 @@
           <a:p>
             <a:fld id="{221FC538-35DC-4230-8357-1F07396E8063}" type="datetimeFigureOut">
               <a:rPr lang="es-419" smtClean="0"/>
-              <a:t>24/9/2024</a:t>
+              <a:t>16/10/2024</a:t>
             </a:fld>
             <a:endParaRPr lang="es-419"/>
           </a:p>
@@ -3272,7 +3347,7 @@
           <a:p>
             <a:fld id="{221FC538-35DC-4230-8357-1F07396E8063}" type="datetimeFigureOut">
               <a:rPr lang="es-419" smtClean="0"/>
-              <a:t>24/9/2024</a:t>
+              <a:t>16/10/2024</a:t>
             </a:fld>
             <a:endParaRPr lang="es-419"/>
           </a:p>
@@ -3414,7 +3489,7 @@
           <a:p>
             <a:fld id="{221FC538-35DC-4230-8357-1F07396E8063}" type="datetimeFigureOut">
               <a:rPr lang="es-419" smtClean="0"/>
-              <a:t>24/9/2024</a:t>
+              <a:t>16/10/2024</a:t>
             </a:fld>
             <a:endParaRPr lang="es-419"/>
           </a:p>
@@ -3527,7 +3602,7 @@
           <a:p>
             <a:fld id="{221FC538-35DC-4230-8357-1F07396E8063}" type="datetimeFigureOut">
               <a:rPr lang="es-419" smtClean="0"/>
-              <a:t>24/9/2024</a:t>
+              <a:t>16/10/2024</a:t>
             </a:fld>
             <a:endParaRPr lang="es-419"/>
           </a:p>
@@ -3840,7 +3915,7 @@
           <a:p>
             <a:fld id="{221FC538-35DC-4230-8357-1F07396E8063}" type="datetimeFigureOut">
               <a:rPr lang="es-419" smtClean="0"/>
-              <a:t>24/9/2024</a:t>
+              <a:t>16/10/2024</a:t>
             </a:fld>
             <a:endParaRPr lang="es-419"/>
           </a:p>
@@ -4129,7 +4204,7 @@
           <a:p>
             <a:fld id="{221FC538-35DC-4230-8357-1F07396E8063}" type="datetimeFigureOut">
               <a:rPr lang="es-419" smtClean="0"/>
-              <a:t>24/9/2024</a:t>
+              <a:t>16/10/2024</a:t>
             </a:fld>
             <a:endParaRPr lang="es-419"/>
           </a:p>
@@ -4372,7 +4447,7 @@
           <a:p>
             <a:fld id="{221FC538-35DC-4230-8357-1F07396E8063}" type="datetimeFigureOut">
               <a:rPr lang="es-419" smtClean="0"/>
-              <a:t>24/9/2024</a:t>
+              <a:t>16/10/2024</a:t>
             </a:fld>
             <a:endParaRPr lang="es-419"/>
           </a:p>
@@ -8726,7 +8801,11 @@
               <a:prstGeom prst="roundRect">
                 <a:avLst/>
               </a:prstGeom>
-              <a:grpFill/>
+              <a:solidFill>
+                <a:schemeClr val="bg1">
+                  <a:lumMod val="65000"/>
+                </a:schemeClr>
+              </a:solidFill>
               <a:ln>
                 <a:noFill/>
               </a:ln>
@@ -10531,7 +10610,11 @@
               <a:prstGeom prst="roundRect">
                 <a:avLst/>
               </a:prstGeom>
-              <a:grpFill/>
+              <a:solidFill>
+                <a:schemeClr val="bg1">
+                  <a:lumMod val="65000"/>
+                </a:schemeClr>
+              </a:solidFill>
               <a:ln>
                 <a:noFill/>
               </a:ln>
@@ -15158,7 +15241,11 @@
               <a:prstGeom prst="roundRect">
                 <a:avLst/>
               </a:prstGeom>
-              <a:grpFill/>
+              <a:solidFill>
+                <a:schemeClr val="bg1">
+                  <a:lumMod val="65000"/>
+                </a:schemeClr>
+              </a:solidFill>
               <a:ln>
                 <a:noFill/>
               </a:ln>
@@ -18398,7 +18485,11 @@
               <a:prstGeom prst="roundRect">
                 <a:avLst/>
               </a:prstGeom>
-              <a:grpFill/>
+              <a:solidFill>
+                <a:schemeClr val="bg1">
+                  <a:lumMod val="65000"/>
+                </a:schemeClr>
+              </a:solidFill>
               <a:ln>
                 <a:noFill/>
               </a:ln>

</xml_diff>

<commit_message>
refactor: Reorganizar estructura de carpetas, moviendo archivos CSS a la carpeta /css
</commit_message>
<xml_diff>
--- a/Documentación/Pantalla/Panrtallas.pptx
+++ b/Documentación/Pantalla/Panrtallas.pptx
@@ -254,6 +254,86 @@
       </pc:sldChg>
     </pc:docChg>
   </pc:docChgLst>
+  <pc:docChgLst>
+    <pc:chgData name="andres felipe martinez henao" userId="0fdce9a793085e1e" providerId="LiveId" clId="{2B8B7581-24B0-45AE-B98A-9012FAB33ED1}"/>
+    <pc:docChg chg="undo redo custSel modSld">
+      <pc:chgData name="andres felipe martinez henao" userId="0fdce9a793085e1e" providerId="LiveId" clId="{2B8B7581-24B0-45AE-B98A-9012FAB33ED1}" dt="2024-11-02T13:10:05.946" v="87" actId="1076"/>
+      <pc:docMkLst>
+        <pc:docMk/>
+      </pc:docMkLst>
+      <pc:sldChg chg="addSp delSp modSp mod">
+        <pc:chgData name="andres felipe martinez henao" userId="0fdce9a793085e1e" providerId="LiveId" clId="{2B8B7581-24B0-45AE-B98A-9012FAB33ED1}" dt="2024-11-02T13:10:05.946" v="87" actId="1076"/>
+        <pc:sldMkLst>
+          <pc:docMk/>
+          <pc:sldMk cId="3287619798" sldId="267"/>
+        </pc:sldMkLst>
+        <pc:spChg chg="mod">
+          <ac:chgData name="andres felipe martinez henao" userId="0fdce9a793085e1e" providerId="LiveId" clId="{2B8B7581-24B0-45AE-B98A-9012FAB33ED1}" dt="2024-11-02T13:02:35.553" v="85" actId="208"/>
+          <ac:spMkLst>
+            <pc:docMk/>
+            <pc:sldMk cId="3287619798" sldId="267"/>
+            <ac:spMk id="12" creationId="{DA9EE002-0CAF-0CE5-B242-9E9C7CE6F1AB}"/>
+          </ac:spMkLst>
+        </pc:spChg>
+        <pc:spChg chg="mod">
+          <ac:chgData name="andres felipe martinez henao" userId="0fdce9a793085e1e" providerId="LiveId" clId="{2B8B7581-24B0-45AE-B98A-9012FAB33ED1}" dt="2024-11-02T13:02:35.553" v="85" actId="208"/>
+          <ac:spMkLst>
+            <pc:docMk/>
+            <pc:sldMk cId="3287619798" sldId="267"/>
+            <ac:spMk id="13" creationId="{4F384B50-BEA6-4C16-8221-BD1D5849F9F6}"/>
+          </ac:spMkLst>
+        </pc:spChg>
+        <pc:spChg chg="mod">
+          <ac:chgData name="andres felipe martinez henao" userId="0fdce9a793085e1e" providerId="LiveId" clId="{2B8B7581-24B0-45AE-B98A-9012FAB33ED1}" dt="2024-11-02T13:02:35.553" v="85" actId="208"/>
+          <ac:spMkLst>
+            <pc:docMk/>
+            <pc:sldMk cId="3287619798" sldId="267"/>
+            <ac:spMk id="14" creationId="{74D81CE8-29B0-52B0-019F-CD2BE3996144}"/>
+          </ac:spMkLst>
+        </pc:spChg>
+        <pc:spChg chg="mod">
+          <ac:chgData name="andres felipe martinez henao" userId="0fdce9a793085e1e" providerId="LiveId" clId="{2B8B7581-24B0-45AE-B98A-9012FAB33ED1}" dt="2024-11-02T13:01:56.574" v="80" actId="208"/>
+          <ac:spMkLst>
+            <pc:docMk/>
+            <pc:sldMk cId="3287619798" sldId="267"/>
+            <ac:spMk id="15" creationId="{61E37B3B-9781-562F-D48E-393A4161E14A}"/>
+          </ac:spMkLst>
+        </pc:spChg>
+        <pc:spChg chg="mod">
+          <ac:chgData name="andres felipe martinez henao" userId="0fdce9a793085e1e" providerId="LiveId" clId="{2B8B7581-24B0-45AE-B98A-9012FAB33ED1}" dt="2024-11-02T13:01:58.347" v="84" actId="20577"/>
+          <ac:spMkLst>
+            <pc:docMk/>
+            <pc:sldMk cId="3287619798" sldId="267"/>
+            <ac:spMk id="18" creationId="{BA02BC76-0EC5-FF80-65CB-B5E91BC1EF75}"/>
+          </ac:spMkLst>
+        </pc:spChg>
+        <pc:spChg chg="mod">
+          <ac:chgData name="andres felipe martinez henao" userId="0fdce9a793085e1e" providerId="LiveId" clId="{2B8B7581-24B0-45AE-B98A-9012FAB33ED1}" dt="2024-11-02T12:56:28.039" v="39" actId="20577"/>
+          <ac:spMkLst>
+            <pc:docMk/>
+            <pc:sldMk cId="3287619798" sldId="267"/>
+            <ac:spMk id="36" creationId="{7595952B-2F3D-BC22-BFFD-070D69440810}"/>
+          </ac:spMkLst>
+        </pc:spChg>
+        <pc:grpChg chg="add del mod">
+          <ac:chgData name="andres felipe martinez henao" userId="0fdce9a793085e1e" providerId="LiveId" clId="{2B8B7581-24B0-45AE-B98A-9012FAB33ED1}" dt="2024-11-02T13:10:05.946" v="87" actId="1076"/>
+          <ac:grpSpMkLst>
+            <pc:docMk/>
+            <pc:sldMk cId="3287619798" sldId="267"/>
+            <ac:grpSpMk id="3" creationId="{1253BBC5-8A13-35E7-9CB2-DCD0E470381E}"/>
+          </ac:grpSpMkLst>
+        </pc:grpChg>
+        <pc:grpChg chg="del mod">
+          <ac:chgData name="andres felipe martinez henao" userId="0fdce9a793085e1e" providerId="LiveId" clId="{2B8B7581-24B0-45AE-B98A-9012FAB33ED1}" dt="2024-11-02T13:09:04.953" v="86" actId="478"/>
+          <ac:grpSpMkLst>
+            <pc:docMk/>
+            <pc:sldMk cId="3287619798" sldId="267"/>
+            <ac:grpSpMk id="33" creationId="{6E386C1F-B905-A679-02C4-F329CB74232B}"/>
+          </ac:grpSpMkLst>
+        </pc:grpChg>
+      </pc:sldChg>
+    </pc:docChg>
+  </pc:docChgLst>
 </pc:chgInfo>
 </file>
 
@@ -371,7 +451,7 @@
           <a:p>
             <a:fld id="{082EC90D-3FAF-437A-A775-97B2260FD027}" type="datetimeFigureOut">
               <a:rPr lang="es-419" smtClean="0"/>
-              <a:t>16/10/2024</a:t>
+              <a:t>2/11/2024</a:t>
             </a:fld>
             <a:endParaRPr lang="es-419"/>
           </a:p>
@@ -1778,7 +1858,7 @@
           <a:p>
             <a:fld id="{221FC538-35DC-4230-8357-1F07396E8063}" type="datetimeFigureOut">
               <a:rPr lang="es-419" smtClean="0"/>
-              <a:t>16/10/2024</a:t>
+              <a:t>2/11/2024</a:t>
             </a:fld>
             <a:endParaRPr lang="es-419"/>
           </a:p>
@@ -1978,7 +2058,7 @@
           <a:p>
             <a:fld id="{221FC538-35DC-4230-8357-1F07396E8063}" type="datetimeFigureOut">
               <a:rPr lang="es-419" smtClean="0"/>
-              <a:t>16/10/2024</a:t>
+              <a:t>2/11/2024</a:t>
             </a:fld>
             <a:endParaRPr lang="es-419"/>
           </a:p>
@@ -2188,7 +2268,7 @@
           <a:p>
             <a:fld id="{221FC538-35DC-4230-8357-1F07396E8063}" type="datetimeFigureOut">
               <a:rPr lang="es-419" smtClean="0"/>
-              <a:t>16/10/2024</a:t>
+              <a:t>2/11/2024</a:t>
             </a:fld>
             <a:endParaRPr lang="es-419"/>
           </a:p>
@@ -2388,7 +2468,7 @@
           <a:p>
             <a:fld id="{221FC538-35DC-4230-8357-1F07396E8063}" type="datetimeFigureOut">
               <a:rPr lang="es-419" smtClean="0"/>
-              <a:t>16/10/2024</a:t>
+              <a:t>2/11/2024</a:t>
             </a:fld>
             <a:endParaRPr lang="es-419"/>
           </a:p>
@@ -2664,7 +2744,7 @@
           <a:p>
             <a:fld id="{221FC538-35DC-4230-8357-1F07396E8063}" type="datetimeFigureOut">
               <a:rPr lang="es-419" smtClean="0"/>
-              <a:t>16/10/2024</a:t>
+              <a:t>2/11/2024</a:t>
             </a:fld>
             <a:endParaRPr lang="es-419"/>
           </a:p>
@@ -2932,7 +3012,7 @@
           <a:p>
             <a:fld id="{221FC538-35DC-4230-8357-1F07396E8063}" type="datetimeFigureOut">
               <a:rPr lang="es-419" smtClean="0"/>
-              <a:t>16/10/2024</a:t>
+              <a:t>2/11/2024</a:t>
             </a:fld>
             <a:endParaRPr lang="es-419"/>
           </a:p>
@@ -3347,7 +3427,7 @@
           <a:p>
             <a:fld id="{221FC538-35DC-4230-8357-1F07396E8063}" type="datetimeFigureOut">
               <a:rPr lang="es-419" smtClean="0"/>
-              <a:t>16/10/2024</a:t>
+              <a:t>2/11/2024</a:t>
             </a:fld>
             <a:endParaRPr lang="es-419"/>
           </a:p>
@@ -3489,7 +3569,7 @@
           <a:p>
             <a:fld id="{221FC538-35DC-4230-8357-1F07396E8063}" type="datetimeFigureOut">
               <a:rPr lang="es-419" smtClean="0"/>
-              <a:t>16/10/2024</a:t>
+              <a:t>2/11/2024</a:t>
             </a:fld>
             <a:endParaRPr lang="es-419"/>
           </a:p>
@@ -3602,7 +3682,7 @@
           <a:p>
             <a:fld id="{221FC538-35DC-4230-8357-1F07396E8063}" type="datetimeFigureOut">
               <a:rPr lang="es-419" smtClean="0"/>
-              <a:t>16/10/2024</a:t>
+              <a:t>2/11/2024</a:t>
             </a:fld>
             <a:endParaRPr lang="es-419"/>
           </a:p>
@@ -3915,7 +3995,7 @@
           <a:p>
             <a:fld id="{221FC538-35DC-4230-8357-1F07396E8063}" type="datetimeFigureOut">
               <a:rPr lang="es-419" smtClean="0"/>
-              <a:t>16/10/2024</a:t>
+              <a:t>2/11/2024</a:t>
             </a:fld>
             <a:endParaRPr lang="es-419"/>
           </a:p>
@@ -4204,7 +4284,7 @@
           <a:p>
             <a:fld id="{221FC538-35DC-4230-8357-1F07396E8063}" type="datetimeFigureOut">
               <a:rPr lang="es-419" smtClean="0"/>
-              <a:t>16/10/2024</a:t>
+              <a:t>2/11/2024</a:t>
             </a:fld>
             <a:endParaRPr lang="es-419"/>
           </a:p>
@@ -4447,7 +4527,7 @@
           <a:p>
             <a:fld id="{221FC538-35DC-4230-8357-1F07396E8063}" type="datetimeFigureOut">
               <a:rPr lang="es-419" smtClean="0"/>
-              <a:t>16/10/2024</a:t>
+              <a:t>2/11/2024</a:t>
             </a:fld>
             <a:endParaRPr lang="es-419"/>
           </a:p>
@@ -20425,6 +20505,11 @@
               <a:avLst/>
             </a:prstGeom>
             <a:grpFill/>
+            <a:ln>
+              <a:solidFill>
+                <a:srgbClr val="FF4C4C"/>
+              </a:solidFill>
+            </a:ln>
           </p:spPr>
           <p:style>
             <a:lnRef idx="2">
@@ -20493,6 +20578,11 @@
                 <a:avLst/>
               </a:prstGeom>
               <a:grpFill/>
+              <a:ln>
+                <a:solidFill>
+                  <a:srgbClr val="FF4C4C"/>
+                </a:solidFill>
+              </a:ln>
             </p:spPr>
             <p:txBody>
               <a:bodyPr wrap="square" rtlCol="0">
@@ -20529,6 +20619,11 @@
                 <a:avLst/>
               </a:prstGeom>
               <a:grpFill/>
+              <a:ln>
+                <a:solidFill>
+                  <a:srgbClr val="FF4C4C"/>
+                </a:solidFill>
+              </a:ln>
             </p:spPr>
             <p:txBody>
               <a:bodyPr wrap="square" rtlCol="0">
@@ -20725,177 +20820,6 @@
       </p:grpSp>
       <p:grpSp>
         <p:nvGrpSpPr>
-          <p:cNvPr id="33" name="Grupo 32">
-            <a:extLst>
-              <a:ext uri="{FF2B5EF4-FFF2-40B4-BE49-F238E27FC236}">
-                <a16:creationId xmlns:a16="http://schemas.microsoft.com/office/drawing/2014/main" id="{6E386C1F-B905-A679-02C4-F329CB74232B}"/>
-              </a:ext>
-            </a:extLst>
-          </p:cNvPr>
-          <p:cNvGrpSpPr/>
-          <p:nvPr/>
-        </p:nvGrpSpPr>
-        <p:grpSpPr>
-          <a:xfrm>
-            <a:off x="2675967" y="3330371"/>
-            <a:ext cx="8238293" cy="1048794"/>
-            <a:chOff x="3200681" y="1256256"/>
-            <a:chExt cx="8238293" cy="1048794"/>
-          </a:xfrm>
-          <a:solidFill>
-            <a:srgbClr val="4CAF50"/>
-          </a:solidFill>
-        </p:grpSpPr>
-        <p:sp>
-          <p:nvSpPr>
-            <p:cNvPr id="34" name="Rectángulo: esquinas redondeadas 33">
-              <a:extLst>
-                <a:ext uri="{FF2B5EF4-FFF2-40B4-BE49-F238E27FC236}">
-                  <a16:creationId xmlns:a16="http://schemas.microsoft.com/office/drawing/2014/main" id="{6EA7A723-1BDF-45B0-23EA-46FC203AEAD7}"/>
-                </a:ext>
-              </a:extLst>
-            </p:cNvPr>
-            <p:cNvSpPr/>
-            <p:nvPr/>
-          </p:nvSpPr>
-          <p:spPr>
-            <a:xfrm>
-              <a:off x="3200681" y="1256256"/>
-              <a:ext cx="8238293" cy="1048794"/>
-            </a:xfrm>
-            <a:prstGeom prst="roundRect">
-              <a:avLst/>
-            </a:prstGeom>
-            <a:grpFill/>
-          </p:spPr>
-          <p:style>
-            <a:lnRef idx="2">
-              <a:schemeClr val="accent1">
-                <a:shade val="15000"/>
-              </a:schemeClr>
-            </a:lnRef>
-            <a:fillRef idx="1">
-              <a:schemeClr val="accent1"/>
-            </a:fillRef>
-            <a:effectRef idx="0">
-              <a:schemeClr val="accent1"/>
-            </a:effectRef>
-            <a:fontRef idx="minor">
-              <a:schemeClr val="lt1"/>
-            </a:fontRef>
-          </p:style>
-          <p:txBody>
-            <a:bodyPr rtlCol="0" anchor="ctr"/>
-            <a:lstStyle/>
-            <a:p>
-              <a:pPr algn="ctr"/>
-              <a:endParaRPr lang="es-419" dirty="0"/>
-            </a:p>
-          </p:txBody>
-        </p:sp>
-        <p:grpSp>
-          <p:nvGrpSpPr>
-            <p:cNvPr id="35" name="Grupo 34">
-              <a:extLst>
-                <a:ext uri="{FF2B5EF4-FFF2-40B4-BE49-F238E27FC236}">
-                  <a16:creationId xmlns:a16="http://schemas.microsoft.com/office/drawing/2014/main" id="{29A8A877-5370-0584-1B26-99E86F9DBC0D}"/>
-                </a:ext>
-              </a:extLst>
-            </p:cNvPr>
-            <p:cNvGrpSpPr/>
-            <p:nvPr/>
-          </p:nvGrpSpPr>
-          <p:grpSpPr>
-            <a:xfrm>
-              <a:off x="3200681" y="1256256"/>
-              <a:ext cx="3926541" cy="972841"/>
-              <a:chOff x="3200681" y="1256256"/>
-              <a:chExt cx="3926541" cy="972841"/>
-            </a:xfrm>
-            <a:grpFill/>
-          </p:grpSpPr>
-          <p:sp>
-            <p:nvSpPr>
-              <p:cNvPr id="36" name="CuadroTexto 35">
-                <a:extLst>
-                  <a:ext uri="{FF2B5EF4-FFF2-40B4-BE49-F238E27FC236}">
-                    <a16:creationId xmlns:a16="http://schemas.microsoft.com/office/drawing/2014/main" id="{7595952B-2F3D-BC22-BFFD-070D69440810}"/>
-                  </a:ext>
-                </a:extLst>
-              </p:cNvPr>
-              <p:cNvSpPr txBox="1"/>
-              <p:nvPr/>
-            </p:nvSpPr>
-            <p:spPr>
-              <a:xfrm>
-                <a:off x="3200681" y="1256256"/>
-                <a:ext cx="3429000" cy="369332"/>
-              </a:xfrm>
-              <a:prstGeom prst="rect">
-                <a:avLst/>
-              </a:prstGeom>
-              <a:grpFill/>
-            </p:spPr>
-            <p:txBody>
-              <a:bodyPr wrap="square" rtlCol="0">
-                <a:spAutoFit/>
-              </a:bodyPr>
-              <a:lstStyle/>
-              <a:p>
-                <a:r>
-                  <a:rPr lang="es-ES" dirty="0"/>
-                  <a:t>Estado : En Progreso </a:t>
-                </a:r>
-                <a:endParaRPr lang="es-419" dirty="0"/>
-              </a:p>
-            </p:txBody>
-          </p:sp>
-          <p:sp>
-            <p:nvSpPr>
-              <p:cNvPr id="37" name="CuadroTexto 36">
-                <a:extLst>
-                  <a:ext uri="{FF2B5EF4-FFF2-40B4-BE49-F238E27FC236}">
-                    <a16:creationId xmlns:a16="http://schemas.microsoft.com/office/drawing/2014/main" id="{49B0C0E2-C6AD-1C90-7131-73EA5F7915E5}"/>
-                  </a:ext>
-                </a:extLst>
-              </p:cNvPr>
-              <p:cNvSpPr txBox="1"/>
-              <p:nvPr/>
-            </p:nvSpPr>
-            <p:spPr>
-              <a:xfrm>
-                <a:off x="3200681" y="1582766"/>
-                <a:ext cx="3926541" cy="646331"/>
-              </a:xfrm>
-              <a:prstGeom prst="rect">
-                <a:avLst/>
-              </a:prstGeom>
-              <a:grpFill/>
-            </p:spPr>
-            <p:txBody>
-              <a:bodyPr wrap="square" rtlCol="0">
-                <a:spAutoFit/>
-              </a:bodyPr>
-              <a:lstStyle/>
-              <a:p>
-                <a:r>
-                  <a:rPr lang="es-ES" dirty="0"/>
-                  <a:t>Título 1</a:t>
-                </a:r>
-              </a:p>
-              <a:p>
-                <a:r>
-                  <a:rPr lang="es-ES" dirty="0"/>
-                  <a:t>Título 2</a:t>
-                </a:r>
-                <a:endParaRPr lang="es-419" dirty="0"/>
-              </a:p>
-            </p:txBody>
-          </p:sp>
-        </p:grpSp>
-      </p:grpSp>
-      <p:grpSp>
-        <p:nvGrpSpPr>
           <p:cNvPr id="3" name="Grupo 2">
             <a:extLst>
               <a:ext uri="{FF2B5EF4-FFF2-40B4-BE49-F238E27FC236}">
@@ -20908,7 +20832,7 @@
         </p:nvGrpSpPr>
         <p:grpSpPr>
           <a:xfrm>
-            <a:off x="2675965" y="4488540"/>
+            <a:off x="2770341" y="3476601"/>
             <a:ext cx="8238293" cy="1048794"/>
             <a:chOff x="3200681" y="1256256"/>
             <a:chExt cx="8238293" cy="1048794"/>
@@ -21015,7 +20939,7 @@
               <a:p>
                 <a:r>
                   <a:rPr lang="es-ES" dirty="0"/>
-                  <a:t>Estado : Comenzadas</a:t>
+                  <a:t>Estado : Comenzada</a:t>
                 </a:r>
                 <a:endParaRPr lang="es-419" dirty="0"/>
               </a:p>

</xml_diff>

<commit_message>
feat: Mejorar estilos de tareas y agregar colores de prioridad según estado issues: #31
</commit_message>
<xml_diff>
--- a/Documentación/Pantalla/Panrtallas.pptx
+++ b/Documentación/Pantalla/Panrtallas.pptx
@@ -254,6 +254,38 @@
       </pc:sldChg>
     </pc:docChg>
   </pc:docChgLst>
+  <pc:docChgLst>
+    <pc:chgData name="andres felipe martinez henao" userId="0fdce9a793085e1e" providerId="LiveId" clId="{2B8B7581-24B0-45AE-B98A-9012FAB33ED1}"/>
+    <pc:docChg chg="undo redo custSel modSld">
+      <pc:chgData name="andres felipe martinez henao" userId="0fdce9a793085e1e" providerId="LiveId" clId="{2B8B7581-24B0-45AE-B98A-9012FAB33ED1}" dt="2024-11-02T17:31:39.977" v="5" actId="1076"/>
+      <pc:docMkLst>
+        <pc:docMk/>
+      </pc:docMkLst>
+      <pc:sldChg chg="addSp delSp modSp mod">
+        <pc:chgData name="andres felipe martinez henao" userId="0fdce9a793085e1e" providerId="LiveId" clId="{2B8B7581-24B0-45AE-B98A-9012FAB33ED1}" dt="2024-11-02T17:31:39.977" v="5" actId="1076"/>
+        <pc:sldMkLst>
+          <pc:docMk/>
+          <pc:sldMk cId="3287619798" sldId="267"/>
+        </pc:sldMkLst>
+        <pc:grpChg chg="mod">
+          <ac:chgData name="andres felipe martinez henao" userId="0fdce9a793085e1e" providerId="LiveId" clId="{2B8B7581-24B0-45AE-B98A-9012FAB33ED1}" dt="2024-11-02T17:31:39.977" v="5" actId="1076"/>
+          <ac:grpSpMkLst>
+            <pc:docMk/>
+            <pc:sldMk cId="3287619798" sldId="267"/>
+            <ac:grpSpMk id="3" creationId="{1253BBC5-8A13-35E7-9CB2-DCD0E470381E}"/>
+          </ac:grpSpMkLst>
+        </pc:grpChg>
+        <pc:grpChg chg="add del">
+          <ac:chgData name="andres felipe martinez henao" userId="0fdce9a793085e1e" providerId="LiveId" clId="{2B8B7581-24B0-45AE-B98A-9012FAB33ED1}" dt="2024-11-02T17:31:38.835" v="4" actId="478"/>
+          <ac:grpSpMkLst>
+            <pc:docMk/>
+            <pc:sldMk cId="3287619798" sldId="267"/>
+            <ac:grpSpMk id="33" creationId="{6E386C1F-B905-A679-02C4-F329CB74232B}"/>
+          </ac:grpSpMkLst>
+        </pc:grpChg>
+      </pc:sldChg>
+    </pc:docChg>
+  </pc:docChgLst>
 </pc:chgInfo>
 </file>
 
@@ -371,7 +403,7 @@
           <a:p>
             <a:fld id="{082EC90D-3FAF-437A-A775-97B2260FD027}" type="datetimeFigureOut">
               <a:rPr lang="es-419" smtClean="0"/>
-              <a:t>16/10/2024</a:t>
+              <a:t>2/11/2024</a:t>
             </a:fld>
             <a:endParaRPr lang="es-419"/>
           </a:p>
@@ -1778,7 +1810,7 @@
           <a:p>
             <a:fld id="{221FC538-35DC-4230-8357-1F07396E8063}" type="datetimeFigureOut">
               <a:rPr lang="es-419" smtClean="0"/>
-              <a:t>16/10/2024</a:t>
+              <a:t>2/11/2024</a:t>
             </a:fld>
             <a:endParaRPr lang="es-419"/>
           </a:p>
@@ -1978,7 +2010,7 @@
           <a:p>
             <a:fld id="{221FC538-35DC-4230-8357-1F07396E8063}" type="datetimeFigureOut">
               <a:rPr lang="es-419" smtClean="0"/>
-              <a:t>16/10/2024</a:t>
+              <a:t>2/11/2024</a:t>
             </a:fld>
             <a:endParaRPr lang="es-419"/>
           </a:p>
@@ -2188,7 +2220,7 @@
           <a:p>
             <a:fld id="{221FC538-35DC-4230-8357-1F07396E8063}" type="datetimeFigureOut">
               <a:rPr lang="es-419" smtClean="0"/>
-              <a:t>16/10/2024</a:t>
+              <a:t>2/11/2024</a:t>
             </a:fld>
             <a:endParaRPr lang="es-419"/>
           </a:p>
@@ -2388,7 +2420,7 @@
           <a:p>
             <a:fld id="{221FC538-35DC-4230-8357-1F07396E8063}" type="datetimeFigureOut">
               <a:rPr lang="es-419" smtClean="0"/>
-              <a:t>16/10/2024</a:t>
+              <a:t>2/11/2024</a:t>
             </a:fld>
             <a:endParaRPr lang="es-419"/>
           </a:p>
@@ -2664,7 +2696,7 @@
           <a:p>
             <a:fld id="{221FC538-35DC-4230-8357-1F07396E8063}" type="datetimeFigureOut">
               <a:rPr lang="es-419" smtClean="0"/>
-              <a:t>16/10/2024</a:t>
+              <a:t>2/11/2024</a:t>
             </a:fld>
             <a:endParaRPr lang="es-419"/>
           </a:p>
@@ -2932,7 +2964,7 @@
           <a:p>
             <a:fld id="{221FC538-35DC-4230-8357-1F07396E8063}" type="datetimeFigureOut">
               <a:rPr lang="es-419" smtClean="0"/>
-              <a:t>16/10/2024</a:t>
+              <a:t>2/11/2024</a:t>
             </a:fld>
             <a:endParaRPr lang="es-419"/>
           </a:p>
@@ -3347,7 +3379,7 @@
           <a:p>
             <a:fld id="{221FC538-35DC-4230-8357-1F07396E8063}" type="datetimeFigureOut">
               <a:rPr lang="es-419" smtClean="0"/>
-              <a:t>16/10/2024</a:t>
+              <a:t>2/11/2024</a:t>
             </a:fld>
             <a:endParaRPr lang="es-419"/>
           </a:p>
@@ -3489,7 +3521,7 @@
           <a:p>
             <a:fld id="{221FC538-35DC-4230-8357-1F07396E8063}" type="datetimeFigureOut">
               <a:rPr lang="es-419" smtClean="0"/>
-              <a:t>16/10/2024</a:t>
+              <a:t>2/11/2024</a:t>
             </a:fld>
             <a:endParaRPr lang="es-419"/>
           </a:p>
@@ -3602,7 +3634,7 @@
           <a:p>
             <a:fld id="{221FC538-35DC-4230-8357-1F07396E8063}" type="datetimeFigureOut">
               <a:rPr lang="es-419" smtClean="0"/>
-              <a:t>16/10/2024</a:t>
+              <a:t>2/11/2024</a:t>
             </a:fld>
             <a:endParaRPr lang="es-419"/>
           </a:p>
@@ -3915,7 +3947,7 @@
           <a:p>
             <a:fld id="{221FC538-35DC-4230-8357-1F07396E8063}" type="datetimeFigureOut">
               <a:rPr lang="es-419" smtClean="0"/>
-              <a:t>16/10/2024</a:t>
+              <a:t>2/11/2024</a:t>
             </a:fld>
             <a:endParaRPr lang="es-419"/>
           </a:p>
@@ -4204,7 +4236,7 @@
           <a:p>
             <a:fld id="{221FC538-35DC-4230-8357-1F07396E8063}" type="datetimeFigureOut">
               <a:rPr lang="es-419" smtClean="0"/>
-              <a:t>16/10/2024</a:t>
+              <a:t>2/11/2024</a:t>
             </a:fld>
             <a:endParaRPr lang="es-419"/>
           </a:p>
@@ -4447,7 +4479,7 @@
           <a:p>
             <a:fld id="{221FC538-35DC-4230-8357-1F07396E8063}" type="datetimeFigureOut">
               <a:rPr lang="es-419" smtClean="0"/>
-              <a:t>16/10/2024</a:t>
+              <a:t>2/11/2024</a:t>
             </a:fld>
             <a:endParaRPr lang="es-419"/>
           </a:p>
@@ -20725,177 +20757,6 @@
       </p:grpSp>
       <p:grpSp>
         <p:nvGrpSpPr>
-          <p:cNvPr id="33" name="Grupo 32">
-            <a:extLst>
-              <a:ext uri="{FF2B5EF4-FFF2-40B4-BE49-F238E27FC236}">
-                <a16:creationId xmlns:a16="http://schemas.microsoft.com/office/drawing/2014/main" id="{6E386C1F-B905-A679-02C4-F329CB74232B}"/>
-              </a:ext>
-            </a:extLst>
-          </p:cNvPr>
-          <p:cNvGrpSpPr/>
-          <p:nvPr/>
-        </p:nvGrpSpPr>
-        <p:grpSpPr>
-          <a:xfrm>
-            <a:off x="2675967" y="3330371"/>
-            <a:ext cx="8238293" cy="1048794"/>
-            <a:chOff x="3200681" y="1256256"/>
-            <a:chExt cx="8238293" cy="1048794"/>
-          </a:xfrm>
-          <a:solidFill>
-            <a:srgbClr val="4CAF50"/>
-          </a:solidFill>
-        </p:grpSpPr>
-        <p:sp>
-          <p:nvSpPr>
-            <p:cNvPr id="34" name="Rectángulo: esquinas redondeadas 33">
-              <a:extLst>
-                <a:ext uri="{FF2B5EF4-FFF2-40B4-BE49-F238E27FC236}">
-                  <a16:creationId xmlns:a16="http://schemas.microsoft.com/office/drawing/2014/main" id="{6EA7A723-1BDF-45B0-23EA-46FC203AEAD7}"/>
-                </a:ext>
-              </a:extLst>
-            </p:cNvPr>
-            <p:cNvSpPr/>
-            <p:nvPr/>
-          </p:nvSpPr>
-          <p:spPr>
-            <a:xfrm>
-              <a:off x="3200681" y="1256256"/>
-              <a:ext cx="8238293" cy="1048794"/>
-            </a:xfrm>
-            <a:prstGeom prst="roundRect">
-              <a:avLst/>
-            </a:prstGeom>
-            <a:grpFill/>
-          </p:spPr>
-          <p:style>
-            <a:lnRef idx="2">
-              <a:schemeClr val="accent1">
-                <a:shade val="15000"/>
-              </a:schemeClr>
-            </a:lnRef>
-            <a:fillRef idx="1">
-              <a:schemeClr val="accent1"/>
-            </a:fillRef>
-            <a:effectRef idx="0">
-              <a:schemeClr val="accent1"/>
-            </a:effectRef>
-            <a:fontRef idx="minor">
-              <a:schemeClr val="lt1"/>
-            </a:fontRef>
-          </p:style>
-          <p:txBody>
-            <a:bodyPr rtlCol="0" anchor="ctr"/>
-            <a:lstStyle/>
-            <a:p>
-              <a:pPr algn="ctr"/>
-              <a:endParaRPr lang="es-419" dirty="0"/>
-            </a:p>
-          </p:txBody>
-        </p:sp>
-        <p:grpSp>
-          <p:nvGrpSpPr>
-            <p:cNvPr id="35" name="Grupo 34">
-              <a:extLst>
-                <a:ext uri="{FF2B5EF4-FFF2-40B4-BE49-F238E27FC236}">
-                  <a16:creationId xmlns:a16="http://schemas.microsoft.com/office/drawing/2014/main" id="{29A8A877-5370-0584-1B26-99E86F9DBC0D}"/>
-                </a:ext>
-              </a:extLst>
-            </p:cNvPr>
-            <p:cNvGrpSpPr/>
-            <p:nvPr/>
-          </p:nvGrpSpPr>
-          <p:grpSpPr>
-            <a:xfrm>
-              <a:off x="3200681" y="1256256"/>
-              <a:ext cx="3926541" cy="972841"/>
-              <a:chOff x="3200681" y="1256256"/>
-              <a:chExt cx="3926541" cy="972841"/>
-            </a:xfrm>
-            <a:grpFill/>
-          </p:grpSpPr>
-          <p:sp>
-            <p:nvSpPr>
-              <p:cNvPr id="36" name="CuadroTexto 35">
-                <a:extLst>
-                  <a:ext uri="{FF2B5EF4-FFF2-40B4-BE49-F238E27FC236}">
-                    <a16:creationId xmlns:a16="http://schemas.microsoft.com/office/drawing/2014/main" id="{7595952B-2F3D-BC22-BFFD-070D69440810}"/>
-                  </a:ext>
-                </a:extLst>
-              </p:cNvPr>
-              <p:cNvSpPr txBox="1"/>
-              <p:nvPr/>
-            </p:nvSpPr>
-            <p:spPr>
-              <a:xfrm>
-                <a:off x="3200681" y="1256256"/>
-                <a:ext cx="3429000" cy="369332"/>
-              </a:xfrm>
-              <a:prstGeom prst="rect">
-                <a:avLst/>
-              </a:prstGeom>
-              <a:grpFill/>
-            </p:spPr>
-            <p:txBody>
-              <a:bodyPr wrap="square" rtlCol="0">
-                <a:spAutoFit/>
-              </a:bodyPr>
-              <a:lstStyle/>
-              <a:p>
-                <a:r>
-                  <a:rPr lang="es-ES" dirty="0"/>
-                  <a:t>Estado : En Progreso </a:t>
-                </a:r>
-                <a:endParaRPr lang="es-419" dirty="0"/>
-              </a:p>
-            </p:txBody>
-          </p:sp>
-          <p:sp>
-            <p:nvSpPr>
-              <p:cNvPr id="37" name="CuadroTexto 36">
-                <a:extLst>
-                  <a:ext uri="{FF2B5EF4-FFF2-40B4-BE49-F238E27FC236}">
-                    <a16:creationId xmlns:a16="http://schemas.microsoft.com/office/drawing/2014/main" id="{49B0C0E2-C6AD-1C90-7131-73EA5F7915E5}"/>
-                  </a:ext>
-                </a:extLst>
-              </p:cNvPr>
-              <p:cNvSpPr txBox="1"/>
-              <p:nvPr/>
-            </p:nvSpPr>
-            <p:spPr>
-              <a:xfrm>
-                <a:off x="3200681" y="1582766"/>
-                <a:ext cx="3926541" cy="646331"/>
-              </a:xfrm>
-              <a:prstGeom prst="rect">
-                <a:avLst/>
-              </a:prstGeom>
-              <a:grpFill/>
-            </p:spPr>
-            <p:txBody>
-              <a:bodyPr wrap="square" rtlCol="0">
-                <a:spAutoFit/>
-              </a:bodyPr>
-              <a:lstStyle/>
-              <a:p>
-                <a:r>
-                  <a:rPr lang="es-ES" dirty="0"/>
-                  <a:t>Título 1</a:t>
-                </a:r>
-              </a:p>
-              <a:p>
-                <a:r>
-                  <a:rPr lang="es-ES" dirty="0"/>
-                  <a:t>Título 2</a:t>
-                </a:r>
-                <a:endParaRPr lang="es-419" dirty="0"/>
-              </a:p>
-            </p:txBody>
-          </p:sp>
-        </p:grpSp>
-      </p:grpSp>
-      <p:grpSp>
-        <p:nvGrpSpPr>
           <p:cNvPr id="3" name="Grupo 2">
             <a:extLst>
               <a:ext uri="{FF2B5EF4-FFF2-40B4-BE49-F238E27FC236}">
@@ -20908,7 +20769,7 @@
         </p:nvGrpSpPr>
         <p:grpSpPr>
           <a:xfrm>
-            <a:off x="2675965" y="4488540"/>
+            <a:off x="2675965" y="3400648"/>
             <a:ext cx="8238293" cy="1048794"/>
             <a:chOff x="3200681" y="1256256"/>
             <a:chExt cx="8238293" cy="1048794"/>

</xml_diff>